<commit_message>
changes to the interface and menu prices
</commit_message>
<xml_diff>
--- a/other/MossMenu.pptx
+++ b/other/MossMenu.pptx
@@ -198,7 +198,7 @@
           <a:p>
             <a:fld id="{B3AF86C2-C0CB-CC42-80D9-BF0DCDD7CB44}" type="datetimeFigureOut">
               <a:rPr lang="en-US" smtClean="0"/>
-              <a:t>7/10/19</a:t>
+              <a:t>8/25/19</a:t>
             </a:fld>
             <a:endParaRPr lang="en-US"/>
           </a:p>
@@ -597,7 +597,7 @@
           <a:p>
             <a:fld id="{DC173241-51F2-E942-989D-930782BC9771}" type="datetimeFigureOut">
               <a:rPr lang="en-US" smtClean="0"/>
-              <a:t>7/10/19</a:t>
+              <a:t>8/25/19</a:t>
             </a:fld>
             <a:endParaRPr lang="en-US"/>
           </a:p>
@@ -762,7 +762,7 @@
           <a:p>
             <a:fld id="{DC173241-51F2-E942-989D-930782BC9771}" type="datetimeFigureOut">
               <a:rPr lang="en-US" smtClean="0"/>
-              <a:t>7/10/19</a:t>
+              <a:t>8/25/19</a:t>
             </a:fld>
             <a:endParaRPr lang="en-US"/>
           </a:p>
@@ -937,7 +937,7 @@
           <a:p>
             <a:fld id="{DC173241-51F2-E942-989D-930782BC9771}" type="datetimeFigureOut">
               <a:rPr lang="en-US" smtClean="0"/>
-              <a:t>7/10/19</a:t>
+              <a:t>8/25/19</a:t>
             </a:fld>
             <a:endParaRPr lang="en-US"/>
           </a:p>
@@ -1102,7 +1102,7 @@
           <a:p>
             <a:fld id="{DC173241-51F2-E942-989D-930782BC9771}" type="datetimeFigureOut">
               <a:rPr lang="en-US" smtClean="0"/>
-              <a:t>7/10/19</a:t>
+              <a:t>8/25/19</a:t>
             </a:fld>
             <a:endParaRPr lang="en-US"/>
           </a:p>
@@ -1341,7 +1341,7 @@
           <a:p>
             <a:fld id="{DC173241-51F2-E942-989D-930782BC9771}" type="datetimeFigureOut">
               <a:rPr lang="en-US" smtClean="0"/>
-              <a:t>7/10/19</a:t>
+              <a:t>8/25/19</a:t>
             </a:fld>
             <a:endParaRPr lang="en-US"/>
           </a:p>
@@ -1568,7 +1568,7 @@
           <a:p>
             <a:fld id="{DC173241-51F2-E942-989D-930782BC9771}" type="datetimeFigureOut">
               <a:rPr lang="en-US" smtClean="0"/>
-              <a:t>7/10/19</a:t>
+              <a:t>8/25/19</a:t>
             </a:fld>
             <a:endParaRPr lang="en-US"/>
           </a:p>
@@ -1930,7 +1930,7 @@
           <a:p>
             <a:fld id="{DC173241-51F2-E942-989D-930782BC9771}" type="datetimeFigureOut">
               <a:rPr lang="en-US" smtClean="0"/>
-              <a:t>7/10/19</a:t>
+              <a:t>8/25/19</a:t>
             </a:fld>
             <a:endParaRPr lang="en-US"/>
           </a:p>
@@ -2043,7 +2043,7 @@
           <a:p>
             <a:fld id="{DC173241-51F2-E942-989D-930782BC9771}" type="datetimeFigureOut">
               <a:rPr lang="en-US" smtClean="0"/>
-              <a:t>7/10/19</a:t>
+              <a:t>8/25/19</a:t>
             </a:fld>
             <a:endParaRPr lang="en-US"/>
           </a:p>
@@ -2133,7 +2133,7 @@
           <a:p>
             <a:fld id="{DC173241-51F2-E942-989D-930782BC9771}" type="datetimeFigureOut">
               <a:rPr lang="en-US" smtClean="0"/>
-              <a:t>7/10/19</a:t>
+              <a:t>8/25/19</a:t>
             </a:fld>
             <a:endParaRPr lang="en-US"/>
           </a:p>
@@ -2405,7 +2405,7 @@
           <a:p>
             <a:fld id="{DC173241-51F2-E942-989D-930782BC9771}" type="datetimeFigureOut">
               <a:rPr lang="en-US" smtClean="0"/>
-              <a:t>7/10/19</a:t>
+              <a:t>8/25/19</a:t>
             </a:fld>
             <a:endParaRPr lang="en-US"/>
           </a:p>
@@ -2657,7 +2657,7 @@
           <a:p>
             <a:fld id="{DC173241-51F2-E942-989D-930782BC9771}" type="datetimeFigureOut">
               <a:rPr lang="en-US" smtClean="0"/>
-              <a:t>7/10/19</a:t>
+              <a:t>8/25/19</a:t>
             </a:fld>
             <a:endParaRPr lang="en-US"/>
           </a:p>
@@ -2865,7 +2865,7 @@
           <a:p>
             <a:fld id="{DC173241-51F2-E942-989D-930782BC9771}" type="datetimeFigureOut">
               <a:rPr lang="en-US" smtClean="0"/>
-              <a:t>7/10/19</a:t>
+              <a:t>8/25/19</a:t>
             </a:fld>
             <a:endParaRPr lang="en-US"/>
           </a:p>
@@ -3913,11 +3913,15 @@
             </a:r>
             <a:r>
               <a:rPr lang="en-US" sz="1200" dirty="0"/>
-              <a:t>2</a:t>
+              <a:t>1</a:t>
+            </a:r>
+            <a:r>
+              <a:rPr lang="en-US" sz="1200" b="1" dirty="0" smtClean="0"/>
+              <a:t> </a:t>
             </a:r>
             <a:r>
               <a:rPr lang="en-US" sz="1200" b="1" dirty="0"/>
-              <a:t> ,  </a:t>
+              <a:t>,  </a:t>
             </a:r>
             <a:r>
               <a:rPr lang="en-US" sz="1200" b="1" i="1" dirty="0"/>
@@ -3929,11 +3933,19 @@
             </a:r>
             <a:r>
               <a:rPr lang="en-US" sz="1200" dirty="0"/>
-              <a:t>4.50</a:t>
+              <a:t>3</a:t>
+            </a:r>
+            <a:r>
+              <a:rPr lang="en-US" sz="1200" dirty="0" smtClean="0"/>
+              <a:t>.50</a:t>
+            </a:r>
+            <a:r>
+              <a:rPr lang="en-US" sz="1200" b="1" dirty="0" smtClean="0"/>
+              <a:t> </a:t>
             </a:r>
             <a:r>
               <a:rPr lang="en-US" sz="1200" b="1" dirty="0"/>
-              <a:t> , </a:t>
+              <a:t>, </a:t>
             </a:r>
             <a:r>
               <a:rPr lang="en-US" sz="1200" b="1" i="1" dirty="0"/>
@@ -3944,73 +3956,90 @@
               <a:t>   </a:t>
             </a:r>
             <a:r>
+              <a:rPr lang="en-US" sz="1200" dirty="0" smtClean="0"/>
+              <a:t>2.50</a:t>
+            </a:r>
+            <a:r>
+              <a:rPr lang="en-US" sz="1200" b="1" dirty="0" smtClean="0"/>
+              <a:t> </a:t>
+            </a:r>
+            <a:r>
+              <a:rPr lang="en-US" sz="1200" b="1" dirty="0"/>
+              <a:t>, </a:t>
+            </a:r>
+            <a:r>
+              <a:rPr lang="en-US" sz="1200" b="1" i="1" dirty="0"/>
+              <a:t>Rice</a:t>
+            </a:r>
+            <a:r>
+              <a:rPr lang="en-US" sz="1200" b="1" dirty="0"/>
+              <a:t>    </a:t>
+            </a:r>
+            <a:r>
+              <a:rPr lang="en-US" sz="1200" dirty="0" smtClean="0"/>
+              <a:t>2.50</a:t>
+            </a:r>
+            <a:r>
+              <a:rPr lang="en-US" sz="1200" b="1" dirty="0" smtClean="0"/>
+              <a:t> </a:t>
+            </a:r>
+            <a:r>
+              <a:rPr lang="en-US" sz="1200" b="1" dirty="0"/>
+              <a:t>, </a:t>
+            </a:r>
+            <a:r>
+              <a:rPr lang="en-US" sz="1200" b="1" i="1" dirty="0"/>
+              <a:t>Bulgur</a:t>
+            </a:r>
+            <a:r>
+              <a:rPr lang="en-US" sz="1200" b="1" dirty="0"/>
+              <a:t>  </a:t>
+            </a:r>
+            <a:r>
+              <a:rPr lang="en-US" sz="1200" dirty="0" smtClean="0"/>
+              <a:t>2.50</a:t>
+            </a:r>
+            <a:r>
+              <a:rPr lang="en-US" sz="1200" b="1" dirty="0" smtClean="0"/>
+              <a:t>, </a:t>
+            </a:r>
+            <a:r>
+              <a:rPr lang="en-US" sz="1200" b="1" i="1" dirty="0"/>
+              <a:t>Olives</a:t>
+            </a:r>
+            <a:r>
+              <a:rPr lang="en-US" sz="1200" b="1" dirty="0"/>
+              <a:t>   </a:t>
+            </a:r>
+            <a:r>
+              <a:rPr lang="en-US" sz="1200" dirty="0" smtClean="0"/>
+              <a:t>2</a:t>
+            </a:r>
+            <a:r>
+              <a:rPr lang="en-US" sz="1200" b="1" dirty="0" smtClean="0"/>
+              <a:t> </a:t>
+            </a:r>
+            <a:r>
+              <a:rPr lang="en-US" sz="1200" b="1" dirty="0"/>
+              <a:t>, </a:t>
+            </a:r>
+            <a:r>
+              <a:rPr lang="en-US" sz="1200" b="1" i="1" dirty="0"/>
+              <a:t>Spicy Moroccan Potatoes</a:t>
+            </a:r>
+            <a:r>
+              <a:rPr lang="en-US" sz="1200" b="1" dirty="0"/>
+              <a:t>   </a:t>
+            </a:r>
+            <a:r>
               <a:rPr lang="en-US" sz="1200" dirty="0"/>
               <a:t>3</a:t>
             </a:r>
             <a:r>
-              <a:rPr lang="en-US" sz="1200" b="1" dirty="0"/>
-              <a:t> , </a:t>
-            </a:r>
-            <a:r>
-              <a:rPr lang="en-US" sz="1200" b="1" i="1" dirty="0"/>
-              <a:t>Rice</a:t>
-            </a:r>
-            <a:r>
-              <a:rPr lang="en-US" sz="1200" b="1" dirty="0"/>
-              <a:t>    </a:t>
-            </a:r>
-            <a:r>
-              <a:rPr lang="en-US" sz="1200" dirty="0"/>
-              <a:t>3</a:t>
-            </a:r>
-            <a:r>
-              <a:rPr lang="en-US" sz="1200" b="1" dirty="0"/>
-              <a:t> , </a:t>
-            </a:r>
-            <a:r>
-              <a:rPr lang="en-US" sz="1200" b="1" i="1" dirty="0"/>
-              <a:t>Bulgur</a:t>
-            </a:r>
-            <a:r>
-              <a:rPr lang="en-US" sz="1200" b="1" dirty="0"/>
-              <a:t>  </a:t>
-            </a:r>
-            <a:r>
-              <a:rPr lang="en-US" sz="1200" dirty="0"/>
-              <a:t>4</a:t>
-            </a:r>
-            <a:r>
-              <a:rPr lang="en-US" sz="1200" b="1" dirty="0"/>
-              <a:t>, </a:t>
-            </a:r>
-            <a:r>
-              <a:rPr lang="en-US" sz="1200" b="1" i="1" dirty="0"/>
-              <a:t>Olives</a:t>
-            </a:r>
-            <a:r>
-              <a:rPr lang="en-US" sz="1200" b="1" dirty="0"/>
-              <a:t>   </a:t>
-            </a:r>
-            <a:r>
-              <a:rPr lang="en-US" sz="1200" dirty="0"/>
-              <a:t>2.50</a:t>
-            </a:r>
-            <a:r>
-              <a:rPr lang="en-US" sz="1200" b="1" dirty="0"/>
-              <a:t> , </a:t>
-            </a:r>
-            <a:r>
-              <a:rPr lang="en-US" sz="1200" b="1" i="1" dirty="0"/>
-              <a:t>Spicy Moroccan Potatoes</a:t>
-            </a:r>
-            <a:r>
-              <a:rPr lang="en-US" sz="1200" b="1" dirty="0"/>
-              <a:t>   </a:t>
-            </a:r>
-            <a:r>
-              <a:rPr lang="en-US" sz="1200" dirty="0"/>
-              <a:t>4.50</a:t>
-            </a:r>
+              <a:rPr lang="en-US" sz="1200" dirty="0" smtClean="0"/>
+              <a:t>.50</a:t>
+            </a:r>
+            <a:endParaRPr lang="en-US" sz="1200" dirty="0"/>
           </a:p>
           <a:p>
             <a:endParaRPr lang="en-US" sz="1200" b="1" dirty="0"/>
@@ -4131,8 +4160,8 @@
         </p:nvSpPr>
         <p:spPr>
           <a:xfrm>
-            <a:off x="813902" y="225151"/>
-            <a:ext cx="4757498" cy="10033516"/>
+            <a:off x="806468" y="225151"/>
+            <a:ext cx="4757498" cy="9561079"/>
           </a:xfrm>
           <a:prstGeom prst="rect">
             <a:avLst/>
@@ -4146,6 +4175,17 @@
           <a:lstStyle/>
           <a:p>
             <a:pPr algn="ctr"/>
+            <a:r>
+              <a:rPr lang="en-US" b="1" dirty="0" smtClean="0">
+                <a:solidFill>
+                  <a:srgbClr val="C00000"/>
+                </a:solidFill>
+                <a:latin typeface="Apple Chancery" charset="0"/>
+                <a:ea typeface="Apple Chancery" charset="0"/>
+                <a:cs typeface="Apple Chancery" charset="0"/>
+              </a:rPr>
+              <a:t>Main </a:t>
+            </a:r>
             <a:r>
               <a:rPr lang="en-US" b="1" dirty="0">
                 <a:solidFill>
@@ -4155,63 +4195,7 @@
                 <a:ea typeface="Apple Chancery" charset="0"/>
                 <a:cs typeface="Apple Chancery" charset="0"/>
               </a:rPr>
-              <a:t>Mezza </a:t>
-            </a:r>
-          </a:p>
-          <a:p>
-            <a:r>
-              <a:rPr lang="en-US" sz="1200" b="1" i="1" dirty="0"/>
-              <a:t>Mezza for two                                                                                                    </a:t>
-            </a:r>
-            <a:r>
-              <a:rPr lang="en-US" sz="1200" b="1" dirty="0"/>
-              <a:t>75 </a:t>
-            </a:r>
-          </a:p>
-          <a:p>
-            <a:r>
-              <a:rPr lang="en-US" sz="1000" dirty="0"/>
-              <a:t>Two starters, main courses ( £4.00 extra for lamb) and desserts with a bottle of house wine. </a:t>
-            </a:r>
-          </a:p>
-          <a:p>
-            <a:endParaRPr lang="en-US" sz="1100" dirty="0"/>
-          </a:p>
-          <a:p>
-            <a:r>
-              <a:rPr lang="en-US" sz="1200" b="1" i="1" dirty="0"/>
-              <a:t>Mezza for parties                                                                                         </a:t>
-            </a:r>
-            <a:r>
-              <a:rPr lang="en-US" sz="1200" b="1" dirty="0"/>
-              <a:t>35 pp  </a:t>
-            </a:r>
-          </a:p>
-          <a:p>
-            <a:r>
-              <a:rPr lang="en-US" sz="1000" dirty="0"/>
-              <a:t>Chef's selection of starters for sharing, your choice of main course, followed by our Moroccan pastries to share. With a half bottle of house wine per person</a:t>
-            </a:r>
-          </a:p>
-          <a:p>
-            <a:endParaRPr lang="en-US" b="1" dirty="0">
-              <a:latin typeface="Apple Chancery" charset="0"/>
-              <a:ea typeface="Apple Chancery" charset="0"/>
-              <a:cs typeface="Apple Chancery" charset="0"/>
-            </a:endParaRPr>
-          </a:p>
-          <a:p>
-            <a:pPr algn="ctr"/>
-            <a:r>
-              <a:rPr lang="en-US" b="1" dirty="0">
-                <a:solidFill>
-                  <a:srgbClr val="C00000"/>
-                </a:solidFill>
-                <a:latin typeface="Apple Chancery" charset="0"/>
-                <a:ea typeface="Apple Chancery" charset="0"/>
-                <a:cs typeface="Apple Chancery" charset="0"/>
-              </a:rPr>
-              <a:t>Main courses </a:t>
+              <a:t>courses </a:t>
             </a:r>
             <a:endParaRPr lang="en-US" dirty="0">
               <a:solidFill>
@@ -4282,8 +4266,13 @@
             </a:r>
             <a:r>
               <a:rPr lang="en-US" sz="1200" b="1" dirty="0"/>
-              <a:t>                                                                                                              17 </a:t>
-            </a:r>
+              <a:t>                                                                                                              </a:t>
+            </a:r>
+            <a:r>
+              <a:rPr lang="en-US" sz="1200" b="1" dirty="0" smtClean="0"/>
+              <a:t>14 </a:t>
+            </a:r>
+            <a:endParaRPr lang="en-US" sz="1200" b="1" dirty="0"/>
           </a:p>
           <a:p>
             <a:r>
@@ -4315,15 +4304,92 @@
             </a:r>
             <a:r>
               <a:rPr lang="de-DE" sz="1200" b="1" dirty="0"/>
-              <a:t>Chicken 15 / Lamb 17</a:t>
+              <a:t>Chicken </a:t>
+            </a:r>
+            <a:r>
+              <a:rPr lang="de-DE" sz="1200" b="1" dirty="0" smtClean="0"/>
+              <a:t>12 </a:t>
+            </a:r>
+            <a:r>
+              <a:rPr lang="de-DE" sz="1200" b="1" dirty="0"/>
+              <a:t>/ </a:t>
+            </a:r>
+            <a:r>
+              <a:rPr lang="de-DE" sz="1200" b="1" dirty="0" smtClean="0"/>
+              <a:t>Lamb 15</a:t>
+            </a:r>
+            <a:endParaRPr lang="en-US" sz="1200" b="1" dirty="0" smtClean="0"/>
+          </a:p>
+          <a:p>
+            <a:r>
+              <a:rPr lang="en-US" sz="1000" dirty="0" smtClean="0"/>
+              <a:t>In olive oil with potato, peas, olives, saffron, garlic, and preserved lemon (1,10,9,12)</a:t>
+            </a:r>
+          </a:p>
+          <a:p>
+            <a:endParaRPr lang="en-US" sz="1000" dirty="0"/>
+          </a:p>
+          <a:p>
+            <a:r>
+              <a:rPr lang="en-US" sz="1200" b="1" i="1" dirty="0"/>
+              <a:t>BEEF </a:t>
+            </a:r>
+            <a:r>
+              <a:rPr lang="en-US" sz="1200" b="1" i="1"/>
+              <a:t>LISSAN                                                                                                        </a:t>
+            </a:r>
+            <a:r>
+              <a:rPr lang="en-US" sz="1200" b="1" smtClean="0"/>
+              <a:t>14</a:t>
             </a:r>
             <a:endParaRPr lang="en-US" sz="1200" b="1" dirty="0"/>
           </a:p>
           <a:p>
             <a:r>
               <a:rPr lang="en-US" sz="1000" dirty="0"/>
-              <a:t>In olive oil with potato, peas, olives, saffron, garlic, and preserved lemon (1,10,9,12)</a:t>
-            </a:r>
+              <a:t>A famous Marrakech dish of  tenderised tongue cooked with chickpea, raisins, cinnamon, harissa, ginger and fresh parsley. </a:t>
+            </a:r>
+          </a:p>
+          <a:p>
+            <a:r>
+              <a:rPr lang="en-US" sz="1000" dirty="0"/>
+              <a:t>Served with Spicy Wheat (1,9,12,13</a:t>
+            </a:r>
+            <a:r>
+              <a:rPr lang="en-US" sz="1000" dirty="0" smtClean="0"/>
+              <a:t>)</a:t>
+            </a:r>
+          </a:p>
+          <a:p>
+            <a:endParaRPr lang="en-US" sz="1100" dirty="0" smtClean="0"/>
+          </a:p>
+          <a:p>
+            <a:r>
+              <a:rPr lang="en-US" sz="1200" b="1" i="1" dirty="0"/>
+              <a:t>ELHAM BARCOQ                                                                                                </a:t>
+            </a:r>
+            <a:r>
+              <a:rPr lang="en-US" sz="1200" b="1" dirty="0" smtClean="0"/>
+              <a:t>15 </a:t>
+            </a:r>
+            <a:endParaRPr lang="en-US" sz="1200" b="1" dirty="0"/>
+          </a:p>
+          <a:p>
+            <a:r>
+              <a:rPr lang="en-US" sz="1000" dirty="0"/>
+              <a:t>Lamb with prune in a subtle cinnamon flavored jus. </a:t>
+            </a:r>
+          </a:p>
+          <a:p>
+            <a:r>
+              <a:rPr lang="en-US" sz="1000" dirty="0"/>
+              <a:t>Served with pitta bread (1,10,9,12 </a:t>
+            </a:r>
+            <a:r>
+              <a:rPr lang="en-US" sz="1000" dirty="0" smtClean="0"/>
+              <a:t>)</a:t>
+            </a:r>
+            <a:endParaRPr lang="en-US" sz="1200" dirty="0" smtClean="0"/>
           </a:p>
           <a:p>
             <a:endParaRPr lang="en-US" sz="1100" dirty="0"/>
@@ -4343,40 +4409,30 @@
             </a:r>
             <a:r>
               <a:rPr lang="en-US" sz="1200" b="1" dirty="0" smtClean="0"/>
-              <a:t>24 </a:t>
+              <a:t>18 </a:t>
             </a:r>
             <a:endParaRPr lang="en-US" sz="1200" b="1" dirty="0"/>
           </a:p>
           <a:p>
             <a:r>
               <a:rPr lang="en-US" sz="1000" dirty="0"/>
-              <a:t>Camel fillet marinated in a date and fig sauce,  with a hint of fiery harissa. Served with bread. (1,10,9,12,13)</a:t>
-            </a:r>
-          </a:p>
-          <a:p>
-            <a:endParaRPr lang="en-US" sz="1400" dirty="0"/>
-          </a:p>
-          <a:p>
-            <a:r>
-              <a:rPr lang="en-US" sz="1200" b="1" i="1" dirty="0"/>
-              <a:t>ELHAM BARCOQ                                                                                                </a:t>
-            </a:r>
-            <a:r>
-              <a:rPr lang="en-US" sz="1200" b="1" dirty="0" smtClean="0"/>
-              <a:t>17 </a:t>
-            </a:r>
-            <a:endParaRPr lang="en-US" sz="1200" b="1" dirty="0"/>
-          </a:p>
-          <a:p>
+              <a:t>Camel fillet marinated in a date and fig sauce,  with a hint of </a:t>
+            </a:r>
+            <a:r>
+              <a:rPr lang="en-US" sz="1000" dirty="0" smtClean="0"/>
+              <a:t>harissa</a:t>
+            </a:r>
             <a:r>
               <a:rPr lang="en-US" sz="1000" dirty="0"/>
-              <a:t>Lamb with prune in a subtle cinnamon flavored jus. </a:t>
-            </a:r>
-          </a:p>
-          <a:p>
+              <a:t>. Served with </a:t>
+            </a:r>
+            <a:r>
+              <a:rPr lang="en-US" sz="1000" dirty="0" smtClean="0"/>
+              <a:t>bread. </a:t>
+            </a:r>
             <a:r>
               <a:rPr lang="en-US" sz="1000" dirty="0"/>
-              <a:t>Served with pitta bread (1,10,9,12 )</a:t>
+              <a:t>(1,10,9,12,13)</a:t>
             </a:r>
           </a:p>
           <a:p>
@@ -4389,7 +4445,7 @@
             </a:r>
             <a:r>
               <a:rPr lang="en-US" sz="1200" b="1" dirty="0" smtClean="0"/>
-              <a:t>18</a:t>
+              <a:t>16</a:t>
             </a:r>
             <a:endParaRPr lang="en-US" sz="1200" b="1" dirty="0"/>
           </a:p>
@@ -4415,7 +4471,7 @@
             </a:r>
             <a:r>
               <a:rPr lang="en-US" sz="1200" b="1" dirty="0" smtClean="0"/>
-              <a:t>18</a:t>
+              <a:t>16</a:t>
             </a:r>
             <a:endParaRPr lang="en-US" sz="1200" b="1" dirty="0"/>
           </a:p>
@@ -4443,7 +4499,7 @@
             </a:r>
             <a:r>
               <a:rPr lang="en-US" sz="1200" b="1" dirty="0" smtClean="0"/>
-              <a:t>18</a:t>
+              <a:t>16</a:t>
             </a:r>
             <a:endParaRPr lang="en-US" sz="1200" b="1" dirty="0"/>
           </a:p>
@@ -4454,12 +4510,20 @@
             </a:r>
           </a:p>
           <a:p>
-            <a:endParaRPr lang="en-US" sz="1100" dirty="0"/>
+            <a:endParaRPr lang="en-US" sz="1000" dirty="0"/>
           </a:p>
           <a:p>
             <a:r>
               <a:rPr lang="en-US" sz="1200" b="1" i="1" dirty="0"/>
-              <a:t>BEEF LISSAN                                                                                                        </a:t>
+              <a:t>MARRAKECH TANGIA</a:t>
+            </a:r>
+            <a:r>
+              <a:rPr lang="en-US" sz="1200" i="1" dirty="0"/>
+              <a:t> </a:t>
+            </a:r>
+            <a:r>
+              <a:rPr lang="en-US" sz="1200" b="1" i="1" dirty="0"/>
+              <a:t>                                                                                      </a:t>
             </a:r>
             <a:r>
               <a:rPr lang="en-US" sz="1200" b="1" dirty="0" smtClean="0"/>
@@ -4470,48 +4534,6 @@
           <a:p>
             <a:r>
               <a:rPr lang="en-US" sz="1000" dirty="0"/>
-              <a:t>A famous Marrakech dish of  tenderised tongue cooked with chickpea, raisins, cinnamon, harissa, ginger and fresh parsley. </a:t>
-            </a:r>
-          </a:p>
-          <a:p>
-            <a:r>
-              <a:rPr lang="en-US" sz="1000" dirty="0"/>
-              <a:t>Served with Spicy Wheat (</a:t>
-            </a:r>
-            <a:r>
-              <a:rPr lang="en-US" sz="1000" dirty="0" smtClean="0"/>
-              <a:t>1,9,12,13</a:t>
-            </a:r>
-            <a:r>
-              <a:rPr lang="en-US" sz="1000" dirty="0"/>
-              <a:t>)</a:t>
-            </a:r>
-          </a:p>
-          <a:p>
-            <a:endParaRPr lang="en-US" sz="1000" dirty="0"/>
-          </a:p>
-          <a:p>
-            <a:r>
-              <a:rPr lang="en-US" sz="1200" b="1" i="1" dirty="0"/>
-              <a:t>MARRAKECH TANGIA</a:t>
-            </a:r>
-            <a:r>
-              <a:rPr lang="en-US" sz="1200" i="1" dirty="0"/>
-              <a:t> </a:t>
-            </a:r>
-            <a:r>
-              <a:rPr lang="en-US" sz="1200" b="1" i="1" dirty="0"/>
-              <a:t>                                                                                      </a:t>
-            </a:r>
-            <a:r>
-              <a:rPr lang="en-US" sz="1200" b="1" dirty="0" smtClean="0"/>
-              <a:t>20</a:t>
-            </a:r>
-            <a:endParaRPr lang="en-US" sz="1200" b="1" dirty="0"/>
-          </a:p>
-          <a:p>
-            <a:r>
-              <a:rPr lang="en-US" sz="1000" dirty="0"/>
               <a:t>Slow cooked beef until tender in a special terracotta pot with our </a:t>
             </a:r>
             <a:r>
@@ -4536,12 +4558,63 @@
             </a:r>
             <a:r>
               <a:rPr lang="en-US" sz="1000" dirty="0" smtClean="0"/>
-              <a:t>1,9,12,13</a:t>
-            </a:r>
+              <a:t>1,9,12,13)</a:t>
+            </a:r>
+          </a:p>
+          <a:p>
+            <a:endParaRPr lang="en-US" sz="1000" dirty="0"/>
+          </a:p>
+          <a:p>
+            <a:pPr algn="ctr"/>
+            <a:r>
+              <a:rPr lang="en-US" sz="1500" b="1" dirty="0">
+                <a:solidFill>
+                  <a:srgbClr val="C00000"/>
+                </a:solidFill>
+                <a:latin typeface="Apple Chancery" charset="0"/>
+                <a:ea typeface="Apple Chancery" charset="0"/>
+                <a:cs typeface="Apple Chancery" charset="0"/>
+              </a:rPr>
+              <a:t>Mezza </a:t>
+            </a:r>
+          </a:p>
+          <a:p>
+            <a:r>
+              <a:rPr lang="en-US" sz="1200" b="1" i="1" dirty="0"/>
+              <a:t>Mezza for two                                                                                                    </a:t>
+            </a:r>
+            <a:r>
+              <a:rPr lang="en-US" sz="1200" b="1" dirty="0"/>
+              <a:t>70 </a:t>
+            </a:r>
+          </a:p>
+          <a:p>
             <a:r>
               <a:rPr lang="en-US" sz="1000" dirty="0"/>
-              <a:t>)</a:t>
-            </a:r>
+              <a:t>Two starters, two main courses and two desserts with a bottle of house wine. </a:t>
+            </a:r>
+          </a:p>
+          <a:p>
+            <a:endParaRPr lang="en-US" sz="1100" dirty="0"/>
+          </a:p>
+          <a:p>
+            <a:r>
+              <a:rPr lang="en-US" sz="1200" b="1" i="1" dirty="0"/>
+              <a:t>Mezza for parties                                                                                         </a:t>
+            </a:r>
+            <a:r>
+              <a:rPr lang="en-US" sz="1200" b="1" dirty="0"/>
+              <a:t>30 pp  </a:t>
+            </a:r>
+          </a:p>
+          <a:p>
+            <a:r>
+              <a:rPr lang="en-US" sz="1000" dirty="0"/>
+              <a:t>Chef's selection of starters for sharing, your choice of main course, followed by our Moroccan pastries to share. With a half bottle of house wine per person</a:t>
+            </a:r>
+          </a:p>
+          <a:p>
+            <a:endParaRPr lang="en-US" sz="1000" dirty="0"/>
           </a:p>
           <a:p>
             <a:endParaRPr lang="en-US" sz="1000" dirty="0"/>
@@ -4605,9 +4678,10 @@
               <a:t>CHICKEN BASTILA                                                                                              </a:t>
             </a:r>
             <a:r>
-              <a:rPr lang="en-US" sz="1200" b="1" dirty="0"/>
-              <a:t>20 </a:t>
-            </a:r>
+              <a:rPr lang="en-US" sz="1200" b="1" dirty="0" smtClean="0"/>
+              <a:t>18</a:t>
+            </a:r>
+            <a:endParaRPr lang="en-US" sz="1200" b="1" dirty="0"/>
           </a:p>
           <a:p>
             <a:r>
@@ -4656,7 +4730,7 @@
             </a:r>
             <a:r>
               <a:rPr lang="en-US" sz="1200" b="1" dirty="0" smtClean="0"/>
-              <a:t>22</a:t>
+              <a:t>20</a:t>
             </a:r>
             <a:endParaRPr lang="en-US" sz="1200" b="1" dirty="0"/>
           </a:p>
@@ -4744,9 +4818,10 @@
               <a:t>Chicken Sultanas                                                                                               </a:t>
             </a:r>
             <a:r>
-              <a:rPr lang="en-US" sz="1200" b="1" dirty="0"/>
-              <a:t>15</a:t>
-            </a:r>
+              <a:rPr lang="en-US" sz="1200" b="1" dirty="0" smtClean="0"/>
+              <a:t>12</a:t>
+            </a:r>
+            <a:endParaRPr lang="en-US" sz="1200" b="1" dirty="0"/>
           </a:p>
           <a:p>
             <a:r>
@@ -4763,9 +4838,10 @@
               <a:t>Chicken Veg                                                                                                        </a:t>
             </a:r>
             <a:r>
-              <a:rPr lang="en-US" sz="1200" b="1" dirty="0"/>
-              <a:t>17</a:t>
-            </a:r>
+              <a:rPr lang="en-US" sz="1200" b="1" dirty="0" smtClean="0"/>
+              <a:t>14</a:t>
+            </a:r>
+            <a:endParaRPr lang="en-US" sz="1200" b="1" dirty="0"/>
           </a:p>
           <a:p>
             <a:r>
@@ -4782,9 +4858,10 @@
               <a:t>Lamb Bi Zbib                                                                                                       </a:t>
             </a:r>
             <a:r>
-              <a:rPr lang="en-US" sz="1200" b="1" dirty="0"/>
-              <a:t>17</a:t>
-            </a:r>
+              <a:rPr lang="en-US" sz="1200" b="1" dirty="0" smtClean="0"/>
+              <a:t>14</a:t>
+            </a:r>
+            <a:endParaRPr lang="en-US" sz="1200" b="1" dirty="0"/>
           </a:p>
           <a:p>
             <a:r>
@@ -4802,7 +4879,7 @@
             </a:r>
             <a:r>
               <a:rPr lang="en-US" sz="1200" b="1" dirty="0" smtClean="0"/>
-              <a:t>18</a:t>
+              <a:t>16</a:t>
             </a:r>
             <a:endParaRPr lang="en-US" sz="1200" b="1" dirty="0"/>
           </a:p>
@@ -4822,7 +4899,7 @@
             </a:r>
             <a:r>
               <a:rPr lang="en-US" sz="1200" b="1" dirty="0" smtClean="0"/>
-              <a:t>20</a:t>
+              <a:t>18</a:t>
             </a:r>
             <a:endParaRPr lang="en-US" sz="1200" b="1" dirty="0"/>
           </a:p>
@@ -4861,9 +4938,10 @@
               <a:t>Vegetable Couscous                                                                                          </a:t>
             </a:r>
             <a:r>
-              <a:rPr lang="en-US" sz="1200" b="1" dirty="0"/>
-              <a:t>14</a:t>
-            </a:r>
+              <a:rPr lang="en-US" sz="1200" b="1" dirty="0" smtClean="0"/>
+              <a:t>12</a:t>
+            </a:r>
+            <a:endParaRPr lang="en-US" sz="1200" b="1" dirty="0"/>
           </a:p>
           <a:p>
             <a:r>
@@ -4894,9 +4972,10 @@
               <a:t>Atlas Vegetarian                                                                                                </a:t>
             </a:r>
             <a:r>
-              <a:rPr lang="en-US" sz="1200" b="1" dirty="0"/>
-              <a:t>14</a:t>
-            </a:r>
+              <a:rPr lang="en-US" sz="1200" b="1" dirty="0" smtClean="0"/>
+              <a:t>12</a:t>
+            </a:r>
+            <a:endParaRPr lang="en-US" sz="1200" b="1" dirty="0"/>
           </a:p>
           <a:p>
             <a:r>
@@ -4928,7 +5007,15 @@
           <a:p>
             <a:r>
               <a:rPr lang="en-US" sz="1050" dirty="0"/>
-              <a:t>Kobiza and Danjal served with couscous and bread</a:t>
+              <a:t>Kobiza and </a:t>
+            </a:r>
+            <a:r>
+              <a:rPr lang="en-US" sz="1050" dirty="0" smtClean="0"/>
+              <a:t>Danjal (from starters) </a:t>
+            </a:r>
+            <a:r>
+              <a:rPr lang="en-US" sz="1050" dirty="0"/>
+              <a:t>served with couscous and bread</a:t>
             </a:r>
           </a:p>
           <a:p>
@@ -4940,9 +5027,10 @@
               <a:t>Shlada Salad MAIN                                                                                           </a:t>
             </a:r>
             <a:r>
-              <a:rPr lang="en-US" sz="1200" b="1" dirty="0"/>
-              <a:t>14</a:t>
-            </a:r>
+              <a:rPr lang="en-US" sz="1200" b="1" dirty="0" smtClean="0"/>
+              <a:t>12</a:t>
+            </a:r>
+            <a:endParaRPr lang="en-US" sz="1200" b="1" dirty="0"/>
           </a:p>
         </p:txBody>
       </p:sp>

</xml_diff>